<commit_message>
added final presentation deets and some other hidden info
</commit_message>
<xml_diff>
--- a/communication.pptx
+++ b/communication.pptx
@@ -5,7 +5,7 @@
     <p:sldMasterId id="2147483648" r:id="rId1"/>
   </p:sldMasterIdLst>
   <p:notesMasterIdLst>
-    <p:notesMasterId r:id="rId7"/>
+    <p:notesMasterId r:id="rId9"/>
   </p:notesMasterIdLst>
   <p:sldIdLst>
     <p:sldId id="340" r:id="rId2"/>
@@ -13,6 +13,8 @@
     <p:sldId id="345" r:id="rId4"/>
     <p:sldId id="344" r:id="rId5"/>
     <p:sldId id="346" r:id="rId6"/>
+    <p:sldId id="347" r:id="rId7"/>
+    <p:sldId id="348" r:id="rId8"/>
   </p:sldIdLst>
   <p:sldSz cx="9144000" cy="6858000" type="screen4x3"/>
   <p:notesSz cx="6858000" cy="9144000"/>
@@ -132,18 +134,10 @@
 
 <file path=ppt/commentAuthors.xml><?xml version="1.0" encoding="utf-8"?>
 <p:cmAuthorLst xmlns:a="http://schemas.openxmlformats.org/drawingml/2006/main" xmlns:r="http://schemas.openxmlformats.org/officeDocument/2006/relationships" xmlns:p="http://schemas.openxmlformats.org/presentationml/2006/main">
-  <p:cmAuthor id="1" name="David A. Beck" initials="DAB" lastIdx="1" clrIdx="0">
-    <p:extLst/>
-  </p:cmAuthor>
-  <p:cmAuthor id="2" name="David A. Beck" initials="DAB [2]" lastIdx="1" clrIdx="1">
-    <p:extLst/>
-  </p:cmAuthor>
-  <p:cmAuthor id="3" name="David A. Beck" initials="DAB [2] [2]" lastIdx="1" clrIdx="2">
-    <p:extLst/>
-  </p:cmAuthor>
-  <p:cmAuthor id="4" name="David A. Beck" initials="DAB [3]" lastIdx="1" clrIdx="3">
-    <p:extLst/>
-  </p:cmAuthor>
+  <p:cmAuthor id="1" name="David A. Beck" initials="DAB" lastIdx="1" clrIdx="0"/>
+  <p:cmAuthor id="2" name="David A. Beck" initials="DAB [2]" lastIdx="1" clrIdx="1"/>
+  <p:cmAuthor id="3" name="David A. Beck" initials="DAB [2] [2]" lastIdx="1" clrIdx="2"/>
+  <p:cmAuthor id="4" name="David A. Beck" initials="DAB [3]" lastIdx="1" clrIdx="3"/>
 </p:cmAuthorLst>
 </file>
 
@@ -229,7 +223,7 @@
           <a:p>
             <a:fld id="{08F62E20-B1AA-3442-B8F1-F4A56998389D}" type="datetimeFigureOut">
               <a:rPr lang="en-US" smtClean="0"/>
-              <a:t>11/5/20</a:t>
+              <a:t>12/2/2021</a:t>
             </a:fld>
             <a:endParaRPr lang="en-US"/>
           </a:p>
@@ -1017,6 +1011,218 @@
     <p:extLst>
       <p:ext uri="{BB962C8B-B14F-4D97-AF65-F5344CB8AC3E}">
         <p14:creationId xmlns:p14="http://schemas.microsoft.com/office/powerpoint/2010/main" val="1099207143"/>
+      </p:ext>
+    </p:extLst>
+  </p:cSld>
+  <p:clrMapOvr>
+    <a:masterClrMapping/>
+  </p:clrMapOvr>
+</p:notes>
+</file>
+
+<file path=ppt/notesSlides/notesSlide6.xml><?xml version="1.0" encoding="utf-8"?>
+<p:notes xmlns:a="http://schemas.openxmlformats.org/drawingml/2006/main" xmlns:r="http://schemas.openxmlformats.org/officeDocument/2006/relationships" xmlns:p="http://schemas.openxmlformats.org/presentationml/2006/main" showMasterSp="0" showMasterPhAnim="0">
+  <p:cSld>
+    <p:spTree>
+      <p:nvGrpSpPr>
+        <p:cNvPr id="1" name="Shape 408"/>
+        <p:cNvGrpSpPr/>
+        <p:nvPr/>
+      </p:nvGrpSpPr>
+      <p:grpSpPr>
+        <a:xfrm>
+          <a:off x="0" y="0"/>
+          <a:ext cx="0" cy="0"/>
+          <a:chOff x="0" y="0"/>
+          <a:chExt cx="0" cy="0"/>
+        </a:xfrm>
+      </p:grpSpPr>
+      <p:sp>
+        <p:nvSpPr>
+          <p:cNvPr id="409" name="Shape 409"/>
+          <p:cNvSpPr txBox="1">
+            <a:spLocks noGrp="1"/>
+          </p:cNvSpPr>
+          <p:nvPr>
+            <p:ph type="body" idx="1"/>
+          </p:nvPr>
+        </p:nvSpPr>
+        <p:spPr>
+          <a:xfrm>
+            <a:off x="685800" y="4343400"/>
+            <a:ext cx="5486399" cy="4114800"/>
+          </a:xfrm>
+          <a:prstGeom prst="rect">
+            <a:avLst/>
+          </a:prstGeom>
+        </p:spPr>
+        <p:txBody>
+          <a:bodyPr lIns="91425" tIns="91425" rIns="91425" bIns="91425" anchor="t" anchorCtr="0">
+            <a:noAutofit/>
+          </a:bodyPr>
+          <a:lstStyle/>
+          <a:p>
+            <a:pPr lvl="0">
+              <a:spcBef>
+                <a:spcPts val="0"/>
+              </a:spcBef>
+              <a:buNone/>
+            </a:pPr>
+            <a:endParaRPr/>
+          </a:p>
+        </p:txBody>
+      </p:sp>
+      <p:sp>
+        <p:nvSpPr>
+          <p:cNvPr id="410" name="Shape 410"/>
+          <p:cNvSpPr>
+            <a:spLocks noGrp="1" noRot="1" noChangeAspect="1"/>
+          </p:cNvSpPr>
+          <p:nvPr>
+            <p:ph type="sldImg" idx="2"/>
+          </p:nvPr>
+        </p:nvSpPr>
+        <p:spPr>
+          <a:xfrm>
+            <a:off x="1143000" y="685800"/>
+            <a:ext cx="4572000" cy="3429000"/>
+          </a:xfrm>
+          <a:custGeom>
+            <a:avLst/>
+            <a:gdLst/>
+            <a:ahLst/>
+            <a:cxnLst/>
+            <a:rect l="0" t="0" r="0" b="0"/>
+            <a:pathLst>
+              <a:path w="120000" h="120000" extrusionOk="0">
+                <a:moveTo>
+                  <a:pt x="0" y="0"/>
+                </a:moveTo>
+                <a:lnTo>
+                  <a:pt x="120000" y="0"/>
+                </a:lnTo>
+                <a:lnTo>
+                  <a:pt x="120000" y="120000"/>
+                </a:lnTo>
+                <a:lnTo>
+                  <a:pt x="0" y="120000"/>
+                </a:lnTo>
+                <a:close/>
+              </a:path>
+            </a:pathLst>
+          </a:custGeom>
+        </p:spPr>
+      </p:sp>
+    </p:spTree>
+    <p:extLst>
+      <p:ext uri="{BB962C8B-B14F-4D97-AF65-F5344CB8AC3E}">
+        <p14:creationId xmlns:p14="http://schemas.microsoft.com/office/powerpoint/2010/main" val="3091097498"/>
+      </p:ext>
+    </p:extLst>
+  </p:cSld>
+  <p:clrMapOvr>
+    <a:masterClrMapping/>
+  </p:clrMapOvr>
+</p:notes>
+</file>
+
+<file path=ppt/notesSlides/notesSlide7.xml><?xml version="1.0" encoding="utf-8"?>
+<p:notes xmlns:a="http://schemas.openxmlformats.org/drawingml/2006/main" xmlns:r="http://schemas.openxmlformats.org/officeDocument/2006/relationships" xmlns:p="http://schemas.openxmlformats.org/presentationml/2006/main" showMasterSp="0" showMasterPhAnim="0">
+  <p:cSld>
+    <p:spTree>
+      <p:nvGrpSpPr>
+        <p:cNvPr id="1" name="Shape 408"/>
+        <p:cNvGrpSpPr/>
+        <p:nvPr/>
+      </p:nvGrpSpPr>
+      <p:grpSpPr>
+        <a:xfrm>
+          <a:off x="0" y="0"/>
+          <a:ext cx="0" cy="0"/>
+          <a:chOff x="0" y="0"/>
+          <a:chExt cx="0" cy="0"/>
+        </a:xfrm>
+      </p:grpSpPr>
+      <p:sp>
+        <p:nvSpPr>
+          <p:cNvPr id="409" name="Shape 409"/>
+          <p:cNvSpPr txBox="1">
+            <a:spLocks noGrp="1"/>
+          </p:cNvSpPr>
+          <p:nvPr>
+            <p:ph type="body" idx="1"/>
+          </p:nvPr>
+        </p:nvSpPr>
+        <p:spPr>
+          <a:xfrm>
+            <a:off x="685800" y="4343400"/>
+            <a:ext cx="5486399" cy="4114800"/>
+          </a:xfrm>
+          <a:prstGeom prst="rect">
+            <a:avLst/>
+          </a:prstGeom>
+        </p:spPr>
+        <p:txBody>
+          <a:bodyPr lIns="91425" tIns="91425" rIns="91425" bIns="91425" anchor="t" anchorCtr="0">
+            <a:noAutofit/>
+          </a:bodyPr>
+          <a:lstStyle/>
+          <a:p>
+            <a:pPr lvl="0">
+              <a:spcBef>
+                <a:spcPts val="0"/>
+              </a:spcBef>
+              <a:buNone/>
+            </a:pPr>
+            <a:endParaRPr/>
+          </a:p>
+        </p:txBody>
+      </p:sp>
+      <p:sp>
+        <p:nvSpPr>
+          <p:cNvPr id="410" name="Shape 410"/>
+          <p:cNvSpPr>
+            <a:spLocks noGrp="1" noRot="1" noChangeAspect="1"/>
+          </p:cNvSpPr>
+          <p:nvPr>
+            <p:ph type="sldImg" idx="2"/>
+          </p:nvPr>
+        </p:nvSpPr>
+        <p:spPr>
+          <a:xfrm>
+            <a:off x="1143000" y="685800"/>
+            <a:ext cx="4572000" cy="3429000"/>
+          </a:xfrm>
+          <a:custGeom>
+            <a:avLst/>
+            <a:gdLst/>
+            <a:ahLst/>
+            <a:cxnLst/>
+            <a:rect l="0" t="0" r="0" b="0"/>
+            <a:pathLst>
+              <a:path w="120000" h="120000" extrusionOk="0">
+                <a:moveTo>
+                  <a:pt x="0" y="0"/>
+                </a:moveTo>
+                <a:lnTo>
+                  <a:pt x="120000" y="0"/>
+                </a:lnTo>
+                <a:lnTo>
+                  <a:pt x="120000" y="120000"/>
+                </a:lnTo>
+                <a:lnTo>
+                  <a:pt x="0" y="120000"/>
+                </a:lnTo>
+                <a:close/>
+              </a:path>
+            </a:pathLst>
+          </a:custGeom>
+        </p:spPr>
+      </p:sp>
+    </p:spTree>
+    <p:extLst>
+      <p:ext uri="{BB962C8B-B14F-4D97-AF65-F5344CB8AC3E}">
+        <p14:creationId xmlns:p14="http://schemas.microsoft.com/office/powerpoint/2010/main" val="181677644"/>
       </p:ext>
     </p:extLst>
   </p:cSld>
@@ -5392,6 +5598,760 @@
     <p:extLst>
       <p:ext uri="{BB962C8B-B14F-4D97-AF65-F5344CB8AC3E}">
         <p14:creationId xmlns:p14="http://schemas.microsoft.com/office/powerpoint/2010/main" val="765810002"/>
+      </p:ext>
+    </p:extLst>
+  </p:cSld>
+  <p:clrMapOvr>
+    <a:masterClrMapping/>
+  </p:clrMapOvr>
+</p:sld>
+</file>
+
+<file path=ppt/slides/slide6.xml><?xml version="1.0" encoding="utf-8"?>
+<p:sld xmlns:a="http://schemas.openxmlformats.org/drawingml/2006/main" xmlns:r="http://schemas.openxmlformats.org/officeDocument/2006/relationships" xmlns:p="http://schemas.openxmlformats.org/presentationml/2006/main">
+  <p:cSld>
+    <p:spTree>
+      <p:nvGrpSpPr>
+        <p:cNvPr id="1" name="Shape 411"/>
+        <p:cNvGrpSpPr/>
+        <p:nvPr/>
+      </p:nvGrpSpPr>
+      <p:grpSpPr>
+        <a:xfrm>
+          <a:off x="0" y="0"/>
+          <a:ext cx="0" cy="0"/>
+          <a:chOff x="0" y="0"/>
+          <a:chExt cx="0" cy="0"/>
+        </a:xfrm>
+      </p:grpSpPr>
+      <p:sp>
+        <p:nvSpPr>
+          <p:cNvPr id="412" name="Shape 412"/>
+          <p:cNvSpPr txBox="1">
+            <a:spLocks noGrp="1"/>
+          </p:cNvSpPr>
+          <p:nvPr>
+            <p:ph type="title"/>
+          </p:nvPr>
+        </p:nvSpPr>
+        <p:spPr>
+          <a:xfrm>
+            <a:off x="457200" y="381000"/>
+            <a:ext cx="8229600" cy="838199"/>
+          </a:xfrm>
+          <a:prstGeom prst="rect">
+            <a:avLst/>
+          </a:prstGeom>
+          <a:noFill/>
+          <a:ln>
+            <a:noFill/>
+          </a:ln>
+        </p:spPr>
+        <p:txBody>
+          <a:bodyPr lIns="91425" tIns="45700" rIns="91425" bIns="45700" anchor="t" anchorCtr="0">
+            <a:noAutofit/>
+          </a:bodyPr>
+          <a:lstStyle/>
+          <a:p>
+            <a:pPr marL="0" marR="0" lvl="0" indent="0" algn="ctr" rtl="0">
+              <a:lnSpc>
+                <a:spcPct val="100000"/>
+              </a:lnSpc>
+              <a:spcBef>
+                <a:spcPts val="0"/>
+              </a:spcBef>
+              <a:spcAft>
+                <a:spcPts val="0"/>
+              </a:spcAft>
+              <a:buClr>
+                <a:schemeClr val="dk1"/>
+              </a:buClr>
+              <a:buSzPct val="25000"/>
+              <a:buFont typeface="Calibri"/>
+              <a:buNone/>
+            </a:pPr>
+            <a:r>
+              <a:rPr lang="en-US" sz="3600" b="1" dirty="0">
+                <a:solidFill>
+                  <a:schemeClr val="dk1"/>
+                </a:solidFill>
+                <a:latin typeface="Calibri"/>
+                <a:ea typeface="Calibri"/>
+                <a:cs typeface="Calibri"/>
+                <a:sym typeface="Calibri"/>
+              </a:rPr>
+              <a:t>Final Presentations</a:t>
+            </a:r>
+            <a:endParaRPr lang="en-US" sz="3600" b="1" i="0" u="none" strike="noStrike" cap="none" dirty="0">
+              <a:solidFill>
+                <a:schemeClr val="dk1"/>
+              </a:solidFill>
+              <a:latin typeface="Calibri"/>
+              <a:ea typeface="Calibri"/>
+              <a:cs typeface="Calibri"/>
+              <a:sym typeface="Calibri"/>
+            </a:endParaRPr>
+          </a:p>
+        </p:txBody>
+      </p:sp>
+      <p:sp>
+        <p:nvSpPr>
+          <p:cNvPr id="413" name="Shape 413"/>
+          <p:cNvSpPr txBox="1">
+            <a:spLocks noGrp="1"/>
+          </p:cNvSpPr>
+          <p:nvPr>
+            <p:ph type="body" idx="1"/>
+          </p:nvPr>
+        </p:nvSpPr>
+        <p:spPr>
+          <a:xfrm>
+            <a:off x="304800" y="1474692"/>
+            <a:ext cx="8458200" cy="4684061"/>
+          </a:xfrm>
+          <a:prstGeom prst="rect">
+            <a:avLst/>
+          </a:prstGeom>
+          <a:noFill/>
+          <a:ln>
+            <a:noFill/>
+          </a:ln>
+        </p:spPr>
+        <p:txBody>
+          <a:bodyPr lIns="91425" tIns="45700" rIns="91425" bIns="45700" anchor="t" anchorCtr="0">
+            <a:noAutofit/>
+          </a:bodyPr>
+          <a:lstStyle/>
+          <a:p>
+            <a:pPr marL="342900" marR="0" lvl="0" indent="-342900" algn="l" rtl="0">
+              <a:lnSpc>
+                <a:spcPct val="100000"/>
+              </a:lnSpc>
+              <a:spcBef>
+                <a:spcPts val="0"/>
+              </a:spcBef>
+              <a:spcAft>
+                <a:spcPts val="0"/>
+              </a:spcAft>
+              <a:buClr>
+                <a:schemeClr val="dk1"/>
+              </a:buClr>
+              <a:buSzPct val="100000"/>
+              <a:buFont typeface="Arial"/>
+              <a:buChar char="•"/>
+            </a:pPr>
+            <a:r>
+              <a:rPr lang="en-US" sz="2800" dirty="0">
+                <a:solidFill>
+                  <a:schemeClr val="dk1"/>
+                </a:solidFill>
+                <a:latin typeface="Calibri"/>
+                <a:ea typeface="Calibri"/>
+                <a:cs typeface="Calibri"/>
+                <a:sym typeface="Calibri"/>
+              </a:rPr>
+              <a:t>12/15 4:30-6:20 in this room</a:t>
+            </a:r>
+          </a:p>
+          <a:p>
+            <a:pPr marL="342900" marR="0" lvl="0" indent="-342900" algn="l" rtl="0">
+              <a:lnSpc>
+                <a:spcPct val="100000"/>
+              </a:lnSpc>
+              <a:spcBef>
+                <a:spcPts val="0"/>
+              </a:spcBef>
+              <a:spcAft>
+                <a:spcPts val="0"/>
+              </a:spcAft>
+              <a:buClr>
+                <a:schemeClr val="dk1"/>
+              </a:buClr>
+              <a:buSzPct val="100000"/>
+              <a:buFont typeface="Arial"/>
+              <a:buChar char="•"/>
+            </a:pPr>
+            <a:r>
+              <a:rPr lang="en-US" sz="2800" dirty="0">
+                <a:solidFill>
+                  <a:schemeClr val="dk1"/>
+                </a:solidFill>
+                <a:latin typeface="Calibri"/>
+                <a:ea typeface="Calibri"/>
+                <a:cs typeface="Calibri"/>
+                <a:sym typeface="Calibri"/>
+              </a:rPr>
+              <a:t>7 minutes </a:t>
+            </a:r>
+            <a:r>
+              <a:rPr lang="en-US" sz="2800">
+                <a:solidFill>
+                  <a:schemeClr val="dk1"/>
+                </a:solidFill>
+                <a:latin typeface="Calibri"/>
+                <a:ea typeface="Calibri"/>
+                <a:cs typeface="Calibri"/>
+                <a:sym typeface="Calibri"/>
+              </a:rPr>
+              <a:t>per team + 2 for questions</a:t>
+            </a:r>
+            <a:endParaRPr lang="en-US" sz="2800" dirty="0">
+              <a:solidFill>
+                <a:schemeClr val="dk1"/>
+              </a:solidFill>
+              <a:latin typeface="Calibri"/>
+              <a:ea typeface="Calibri"/>
+              <a:cs typeface="Calibri"/>
+              <a:sym typeface="Calibri"/>
+            </a:endParaRPr>
+          </a:p>
+          <a:p>
+            <a:pPr lvl="1" indent="-342900">
+              <a:spcBef>
+                <a:spcPts val="0"/>
+              </a:spcBef>
+              <a:buClr>
+                <a:schemeClr val="dk1"/>
+              </a:buClr>
+              <a:buSzPct val="100000"/>
+              <a:buFont typeface="Arial"/>
+              <a:buChar char="•"/>
+            </a:pPr>
+            <a:r>
+              <a:rPr lang="en-US" sz="2400" dirty="0">
+                <a:solidFill>
+                  <a:schemeClr val="dk1"/>
+                </a:solidFill>
+                <a:latin typeface="Calibri"/>
+                <a:ea typeface="Calibri"/>
+                <a:cs typeface="Calibri"/>
+                <a:sym typeface="Calibri"/>
+              </a:rPr>
+              <a:t>Anyone who wants to speak should have the chance</a:t>
+            </a:r>
+          </a:p>
+          <a:p>
+            <a:pPr lvl="1" indent="-342900">
+              <a:spcBef>
+                <a:spcPts val="0"/>
+              </a:spcBef>
+              <a:buClr>
+                <a:schemeClr val="dk1"/>
+              </a:buClr>
+              <a:buSzPct val="100000"/>
+              <a:buFont typeface="Arial"/>
+              <a:buChar char="•"/>
+            </a:pPr>
+            <a:endParaRPr lang="en-US" sz="2400" dirty="0">
+              <a:solidFill>
+                <a:schemeClr val="dk1"/>
+              </a:solidFill>
+              <a:latin typeface="Calibri"/>
+              <a:ea typeface="Calibri"/>
+              <a:cs typeface="Calibri"/>
+              <a:sym typeface="Calibri"/>
+            </a:endParaRPr>
+          </a:p>
+          <a:p>
+            <a:pPr>
+              <a:spcBef>
+                <a:spcPts val="0"/>
+              </a:spcBef>
+              <a:buClr>
+                <a:schemeClr val="dk1"/>
+              </a:buClr>
+              <a:buSzPct val="100000"/>
+            </a:pPr>
+            <a:r>
+              <a:rPr lang="en-US" sz="2800" dirty="0">
+                <a:solidFill>
+                  <a:schemeClr val="dk1"/>
+                </a:solidFill>
+                <a:latin typeface="Calibri"/>
+                <a:ea typeface="Calibri"/>
+                <a:cs typeface="Calibri"/>
+                <a:sym typeface="Calibri"/>
+              </a:rPr>
+              <a:t>Outline</a:t>
+            </a:r>
+          </a:p>
+          <a:p>
+            <a:pPr lvl="1">
+              <a:spcBef>
+                <a:spcPts val="0"/>
+              </a:spcBef>
+              <a:buClr>
+                <a:schemeClr val="dk1"/>
+              </a:buClr>
+              <a:buSzPct val="100000"/>
+            </a:pPr>
+            <a:r>
+              <a:rPr lang="en-US" sz="2400" b="1" dirty="0">
+                <a:solidFill>
+                  <a:schemeClr val="dk1"/>
+                </a:solidFill>
+                <a:latin typeface="Calibri"/>
+                <a:ea typeface="Calibri"/>
+                <a:cs typeface="Calibri"/>
+                <a:sym typeface="Calibri"/>
+              </a:rPr>
+              <a:t>Introduction, background</a:t>
+            </a:r>
+          </a:p>
+          <a:p>
+            <a:pPr lvl="1">
+              <a:spcBef>
+                <a:spcPts val="0"/>
+              </a:spcBef>
+              <a:buClr>
+                <a:schemeClr val="dk1"/>
+              </a:buClr>
+              <a:buSzPct val="100000"/>
+            </a:pPr>
+            <a:r>
+              <a:rPr lang="en-US" sz="2400" b="1" dirty="0">
+                <a:solidFill>
+                  <a:schemeClr val="dk1"/>
+                </a:solidFill>
+                <a:latin typeface="Calibri"/>
+                <a:ea typeface="Calibri"/>
+                <a:cs typeface="Calibri"/>
+                <a:sym typeface="Calibri"/>
+              </a:rPr>
+              <a:t>Design (schematics of components, description, etc.)</a:t>
+            </a:r>
+          </a:p>
+          <a:p>
+            <a:pPr lvl="1">
+              <a:spcBef>
+                <a:spcPts val="0"/>
+              </a:spcBef>
+              <a:buClr>
+                <a:schemeClr val="dk1"/>
+              </a:buClr>
+              <a:buSzPct val="100000"/>
+            </a:pPr>
+            <a:r>
+              <a:rPr lang="en-US" sz="2400" dirty="0">
+                <a:solidFill>
+                  <a:schemeClr val="dk1"/>
+                </a:solidFill>
+                <a:latin typeface="Calibri"/>
+                <a:ea typeface="Calibri"/>
+                <a:cs typeface="Calibri"/>
+                <a:sym typeface="Calibri"/>
+              </a:rPr>
+              <a:t>Technologies employed</a:t>
+            </a:r>
+          </a:p>
+          <a:p>
+            <a:pPr lvl="1">
+              <a:spcBef>
+                <a:spcPts val="0"/>
+              </a:spcBef>
+              <a:buClr>
+                <a:schemeClr val="dk1"/>
+              </a:buClr>
+              <a:buSzPct val="100000"/>
+            </a:pPr>
+            <a:r>
+              <a:rPr lang="en-US" sz="2400" i="1" dirty="0">
+                <a:solidFill>
+                  <a:schemeClr val="dk1"/>
+                </a:solidFill>
+                <a:latin typeface="Calibri"/>
+                <a:ea typeface="Calibri"/>
+                <a:cs typeface="Calibri"/>
+                <a:sym typeface="Calibri"/>
+              </a:rPr>
+              <a:t>Demo (or not; prerecord if possible)</a:t>
+            </a:r>
+          </a:p>
+          <a:p>
+            <a:pPr lvl="1">
+              <a:spcBef>
+                <a:spcPts val="0"/>
+              </a:spcBef>
+              <a:buClr>
+                <a:schemeClr val="dk1"/>
+              </a:buClr>
+              <a:buSzPct val="100000"/>
+            </a:pPr>
+            <a:r>
+              <a:rPr lang="en-US" sz="2400" dirty="0">
+                <a:solidFill>
+                  <a:schemeClr val="dk1"/>
+                </a:solidFill>
+                <a:latin typeface="Calibri"/>
+                <a:ea typeface="Calibri"/>
+                <a:cs typeface="Calibri"/>
+                <a:sym typeface="Calibri"/>
+              </a:rPr>
+              <a:t>Collaboration strategies you used</a:t>
+            </a:r>
+          </a:p>
+          <a:p>
+            <a:pPr lvl="1">
+              <a:spcBef>
+                <a:spcPts val="0"/>
+              </a:spcBef>
+              <a:buClr>
+                <a:schemeClr val="dk1"/>
+              </a:buClr>
+              <a:buSzPct val="100000"/>
+            </a:pPr>
+            <a:r>
+              <a:rPr lang="en-US" sz="2400" dirty="0">
+                <a:solidFill>
+                  <a:schemeClr val="dk1"/>
+                </a:solidFill>
+                <a:latin typeface="Calibri"/>
+                <a:ea typeface="Calibri"/>
+                <a:cs typeface="Calibri"/>
+                <a:sym typeface="Calibri"/>
+              </a:rPr>
+              <a:t>Challenges (if any)</a:t>
+            </a:r>
+          </a:p>
+          <a:p>
+            <a:pPr lvl="1">
+              <a:spcBef>
+                <a:spcPts val="0"/>
+              </a:spcBef>
+              <a:buClr>
+                <a:schemeClr val="dk1"/>
+              </a:buClr>
+              <a:buSzPct val="100000"/>
+            </a:pPr>
+            <a:r>
+              <a:rPr lang="en-US" sz="2400" b="1" dirty="0">
+                <a:solidFill>
+                  <a:schemeClr val="dk1"/>
+                </a:solidFill>
+                <a:latin typeface="Calibri"/>
+                <a:ea typeface="Calibri"/>
+                <a:cs typeface="Calibri"/>
+                <a:sym typeface="Calibri"/>
+              </a:rPr>
+              <a:t>Lessons learned</a:t>
+            </a:r>
+          </a:p>
+        </p:txBody>
+      </p:sp>
+    </p:spTree>
+    <p:extLst>
+      <p:ext uri="{BB962C8B-B14F-4D97-AF65-F5344CB8AC3E}">
+        <p14:creationId xmlns:p14="http://schemas.microsoft.com/office/powerpoint/2010/main" val="1930903757"/>
+      </p:ext>
+    </p:extLst>
+  </p:cSld>
+  <p:clrMapOvr>
+    <a:masterClrMapping/>
+  </p:clrMapOvr>
+</p:sld>
+</file>
+
+<file path=ppt/slides/slide7.xml><?xml version="1.0" encoding="utf-8"?>
+<p:sld xmlns:a="http://schemas.openxmlformats.org/drawingml/2006/main" xmlns:r="http://schemas.openxmlformats.org/officeDocument/2006/relationships" xmlns:p="http://schemas.openxmlformats.org/presentationml/2006/main">
+  <p:cSld>
+    <p:spTree>
+      <p:nvGrpSpPr>
+        <p:cNvPr id="1" name="Shape 411"/>
+        <p:cNvGrpSpPr/>
+        <p:nvPr/>
+      </p:nvGrpSpPr>
+      <p:grpSpPr>
+        <a:xfrm>
+          <a:off x="0" y="0"/>
+          <a:ext cx="0" cy="0"/>
+          <a:chOff x="0" y="0"/>
+          <a:chExt cx="0" cy="0"/>
+        </a:xfrm>
+      </p:grpSpPr>
+      <p:sp>
+        <p:nvSpPr>
+          <p:cNvPr id="412" name="Shape 412"/>
+          <p:cNvSpPr txBox="1">
+            <a:spLocks noGrp="1"/>
+          </p:cNvSpPr>
+          <p:nvPr>
+            <p:ph type="title"/>
+          </p:nvPr>
+        </p:nvSpPr>
+        <p:spPr>
+          <a:xfrm>
+            <a:off x="457200" y="381000"/>
+            <a:ext cx="8229600" cy="838199"/>
+          </a:xfrm>
+          <a:prstGeom prst="rect">
+            <a:avLst/>
+          </a:prstGeom>
+          <a:noFill/>
+          <a:ln>
+            <a:noFill/>
+          </a:ln>
+        </p:spPr>
+        <p:txBody>
+          <a:bodyPr lIns="91425" tIns="45700" rIns="91425" bIns="45700" anchor="t" anchorCtr="0">
+            <a:noAutofit/>
+          </a:bodyPr>
+          <a:lstStyle/>
+          <a:p>
+            <a:pPr marL="0" marR="0" lvl="0" indent="0" algn="ctr" rtl="0">
+              <a:lnSpc>
+                <a:spcPct val="100000"/>
+              </a:lnSpc>
+              <a:spcBef>
+                <a:spcPts val="0"/>
+              </a:spcBef>
+              <a:spcAft>
+                <a:spcPts val="0"/>
+              </a:spcAft>
+              <a:buClr>
+                <a:schemeClr val="dk1"/>
+              </a:buClr>
+              <a:buSzPct val="25000"/>
+              <a:buFont typeface="Calibri"/>
+              <a:buNone/>
+            </a:pPr>
+            <a:r>
+              <a:rPr lang="en-US" sz="3600" b="1" i="0" u="none" strike="noStrike" cap="none" dirty="0">
+                <a:solidFill>
+                  <a:schemeClr val="dk1"/>
+                </a:solidFill>
+                <a:latin typeface="Calibri"/>
+                <a:ea typeface="Calibri"/>
+                <a:cs typeface="Calibri"/>
+                <a:sym typeface="Calibri"/>
+              </a:rPr>
+              <a:t>I need your help!</a:t>
+            </a:r>
+          </a:p>
+        </p:txBody>
+      </p:sp>
+      <p:sp>
+        <p:nvSpPr>
+          <p:cNvPr id="413" name="Shape 413"/>
+          <p:cNvSpPr txBox="1">
+            <a:spLocks noGrp="1"/>
+          </p:cNvSpPr>
+          <p:nvPr>
+            <p:ph type="body" idx="1"/>
+          </p:nvPr>
+        </p:nvSpPr>
+        <p:spPr>
+          <a:xfrm>
+            <a:off x="304800" y="1474692"/>
+            <a:ext cx="8458200" cy="4684061"/>
+          </a:xfrm>
+          <a:prstGeom prst="rect">
+            <a:avLst/>
+          </a:prstGeom>
+          <a:noFill/>
+          <a:ln>
+            <a:noFill/>
+          </a:ln>
+        </p:spPr>
+        <p:txBody>
+          <a:bodyPr lIns="91425" tIns="45700" rIns="91425" bIns="45700" anchor="t" anchorCtr="0">
+            <a:noAutofit/>
+          </a:bodyPr>
+          <a:lstStyle/>
+          <a:p>
+            <a:pPr marL="342900" marR="0" lvl="0" indent="-342900" algn="l" rtl="0">
+              <a:lnSpc>
+                <a:spcPct val="100000"/>
+              </a:lnSpc>
+              <a:spcBef>
+                <a:spcPts val="0"/>
+              </a:spcBef>
+              <a:spcAft>
+                <a:spcPts val="0"/>
+              </a:spcAft>
+              <a:buClr>
+                <a:schemeClr val="dk1"/>
+              </a:buClr>
+              <a:buSzPct val="100000"/>
+              <a:buFont typeface="Arial"/>
+              <a:buChar char="•"/>
+            </a:pPr>
+            <a:r>
+              <a:rPr lang="en-US" sz="2800" dirty="0">
+                <a:solidFill>
+                  <a:schemeClr val="dk1"/>
+                </a:solidFill>
+                <a:latin typeface="Calibri"/>
+                <a:ea typeface="Calibri"/>
+                <a:cs typeface="Calibri"/>
+                <a:sym typeface="Calibri"/>
+              </a:rPr>
+              <a:t>Please fill out the course evaluations</a:t>
+            </a:r>
+          </a:p>
+          <a:p>
+            <a:pPr lvl="1" indent="-342900">
+              <a:spcBef>
+                <a:spcPts val="0"/>
+              </a:spcBef>
+              <a:buClr>
+                <a:schemeClr val="dk1"/>
+              </a:buClr>
+              <a:buSzPct val="100000"/>
+              <a:buFont typeface="Arial"/>
+              <a:buChar char="•"/>
+            </a:pPr>
+            <a:r>
+              <a:rPr lang="en-US" b="0" i="0" u="none" dirty="0">
+                <a:solidFill>
+                  <a:schemeClr val="dk1"/>
+                </a:solidFill>
+                <a:latin typeface="Calibri"/>
+                <a:ea typeface="Calibri"/>
+                <a:cs typeface="Calibri"/>
+                <a:sym typeface="Calibri"/>
+              </a:rPr>
+              <a:t>I use these every year to make improvements in the course</a:t>
+            </a:r>
+            <a:r>
+              <a:rPr lang="en-US" dirty="0">
+                <a:solidFill>
+                  <a:schemeClr val="dk1"/>
+                </a:solidFill>
+                <a:latin typeface="Calibri"/>
+                <a:ea typeface="Calibri"/>
+                <a:cs typeface="Calibri"/>
+                <a:sym typeface="Calibri"/>
+              </a:rPr>
+              <a:t> and to find out what is working so your feedback is essential for continuous improvement</a:t>
+            </a:r>
+          </a:p>
+          <a:p>
+            <a:pPr lvl="1" indent="-342900">
+              <a:spcBef>
+                <a:spcPts val="0"/>
+              </a:spcBef>
+              <a:buClr>
+                <a:schemeClr val="dk1"/>
+              </a:buClr>
+              <a:buSzPct val="100000"/>
+              <a:buFont typeface="Arial"/>
+              <a:buChar char="•"/>
+            </a:pPr>
+            <a:endParaRPr lang="en-US" b="0" i="0" u="none" dirty="0">
+              <a:solidFill>
+                <a:schemeClr val="dk1"/>
+              </a:solidFill>
+              <a:latin typeface="Calibri"/>
+              <a:ea typeface="Calibri"/>
+              <a:cs typeface="Calibri"/>
+              <a:sym typeface="Calibri"/>
+            </a:endParaRPr>
+          </a:p>
+          <a:p>
+            <a:pPr>
+              <a:spcBef>
+                <a:spcPts val="0"/>
+              </a:spcBef>
+              <a:buClr>
+                <a:schemeClr val="dk1"/>
+              </a:buClr>
+              <a:buSzPct val="100000"/>
+            </a:pPr>
+            <a:r>
+              <a:rPr lang="en-US" sz="2800" dirty="0">
+                <a:solidFill>
+                  <a:schemeClr val="dk1"/>
+                </a:solidFill>
+                <a:latin typeface="Calibri"/>
+                <a:ea typeface="Calibri"/>
+                <a:cs typeface="Calibri"/>
+                <a:sym typeface="Calibri"/>
+              </a:rPr>
+              <a:t>Help me prepare nomination materials for Anant Mittal (TA)</a:t>
+            </a:r>
+          </a:p>
+          <a:p>
+            <a:pPr lvl="1">
+              <a:spcBef>
+                <a:spcPts val="0"/>
+              </a:spcBef>
+              <a:buClr>
+                <a:schemeClr val="dk1"/>
+              </a:buClr>
+              <a:buSzPct val="100000"/>
+            </a:pPr>
+            <a:r>
+              <a:rPr lang="en-US" b="0" i="0" u="none" dirty="0">
+                <a:solidFill>
+                  <a:schemeClr val="dk1"/>
+                </a:solidFill>
+                <a:latin typeface="Calibri"/>
+                <a:ea typeface="Calibri"/>
+                <a:cs typeface="Calibri"/>
+                <a:sym typeface="Calibri"/>
+              </a:rPr>
+              <a:t>Use this link to provide a few sentences about Anant’s awesomeness</a:t>
+            </a:r>
+          </a:p>
+          <a:p>
+            <a:pPr lvl="1">
+              <a:spcBef>
+                <a:spcPts val="0"/>
+              </a:spcBef>
+              <a:buClr>
+                <a:schemeClr val="dk1"/>
+              </a:buClr>
+              <a:buSzPct val="100000"/>
+            </a:pPr>
+            <a:r>
+              <a:rPr lang="en-US" b="0" i="0" u="none" dirty="0">
+                <a:solidFill>
+                  <a:schemeClr val="dk1"/>
+                </a:solidFill>
+                <a:latin typeface="Calibri"/>
+                <a:ea typeface="Calibri"/>
+                <a:cs typeface="Calibri"/>
+                <a:sym typeface="Calibri"/>
+                <a:hlinkClick r:id="rId3"/>
+              </a:rPr>
+              <a:t>https://forms.gle/twraahvUWKuyvuPr7</a:t>
+            </a:r>
+            <a:endParaRPr lang="en-US" dirty="0">
+              <a:solidFill>
+                <a:schemeClr val="dk1"/>
+              </a:solidFill>
+              <a:latin typeface="Calibri"/>
+              <a:ea typeface="Calibri"/>
+              <a:cs typeface="Calibri"/>
+              <a:sym typeface="Calibri"/>
+            </a:endParaRPr>
+          </a:p>
+          <a:p>
+            <a:pPr lvl="1">
+              <a:spcBef>
+                <a:spcPts val="0"/>
+              </a:spcBef>
+              <a:buClr>
+                <a:schemeClr val="dk1"/>
+              </a:buClr>
+              <a:buSzPct val="100000"/>
+            </a:pPr>
+            <a:endParaRPr lang="en-US" b="0" i="0" u="none" dirty="0">
+              <a:solidFill>
+                <a:schemeClr val="dk1"/>
+              </a:solidFill>
+              <a:latin typeface="Calibri"/>
+              <a:ea typeface="Calibri"/>
+              <a:cs typeface="Calibri"/>
+              <a:sym typeface="Calibri"/>
+            </a:endParaRPr>
+          </a:p>
+        </p:txBody>
+      </p:sp>
+    </p:spTree>
+    <p:extLst>
+      <p:ext uri="{BB962C8B-B14F-4D97-AF65-F5344CB8AC3E}">
+        <p14:creationId xmlns:p14="http://schemas.microsoft.com/office/powerpoint/2010/main" val="2434622633"/>
       </p:ext>
     </p:extLst>
   </p:cSld>

</xml_diff>

<commit_message>
updated dates and some content guidelines
</commit_message>
<xml_diff>
--- a/communication.pptx
+++ b/communication.pptx
@@ -223,7 +223,7 @@
           <a:p>
             <a:fld id="{08F62E20-B1AA-3442-B8F1-F4A56998389D}" type="datetimeFigureOut">
               <a:rPr lang="en-US" smtClean="0"/>
-              <a:t>12/2/2021</a:t>
+              <a:t>11/7/2024</a:t>
             </a:fld>
             <a:endParaRPr lang="en-US"/>
           </a:p>
@@ -4450,7 +4450,7 @@
                 <a:cs typeface="Calibri"/>
                 <a:sym typeface="Calibri"/>
               </a:rPr>
-              <a:t>Next Thu. every project will present</a:t>
+              <a:t>Next Tue. every project will present</a:t>
             </a:r>
           </a:p>
           <a:p>
@@ -4499,7 +4499,7 @@
                 <a:cs typeface="Calibri"/>
                 <a:sym typeface="Calibri"/>
               </a:rPr>
-              <a:t> I will cut you off</a:t>
+              <a:t> Natalie will cut you off</a:t>
             </a:r>
           </a:p>
           <a:p>
@@ -4583,7 +4583,7 @@
                 <a:cs typeface="Calibri"/>
                 <a:sym typeface="Calibri"/>
               </a:rPr>
-              <a:t>Background: your application and why you want to use it, 1 slide</a:t>
+              <a:t>1 min for intro and background including the three competing technologies you choose</a:t>
             </a:r>
           </a:p>
           <a:p>
@@ -4599,16 +4599,16 @@
               <a:buChar char="•"/>
             </a:pPr>
             <a:r>
-              <a:rPr lang="en-US" sz="2000" b="0" i="0" u="none" strike="noStrike" cap="none" dirty="0">
-                <a:solidFill>
-                  <a:schemeClr val="dk1"/>
-                </a:solidFill>
-                <a:latin typeface="Calibri"/>
-                <a:ea typeface="Calibri"/>
-                <a:cs typeface="Calibri"/>
-                <a:sym typeface="Calibri"/>
-              </a:rPr>
-              <a:t>What technologies you considered: 1 slide</a:t>
+              <a:rPr lang="en-US" sz="2000" dirty="0">
+                <a:solidFill>
+                  <a:schemeClr val="dk1"/>
+                </a:solidFill>
+                <a:latin typeface="Calibri"/>
+                <a:ea typeface="Calibri"/>
+                <a:cs typeface="Calibri"/>
+                <a:sym typeface="Calibri"/>
+              </a:rPr>
+              <a:t>1 min for tech option 1</a:t>
             </a:r>
           </a:p>
           <a:p>
@@ -4633,17 +4633,8 @@
                 <a:cs typeface="Calibri"/>
                 <a:sym typeface="Calibri"/>
               </a:rPr>
-              <a:t>Choice: what you chose to use, summary  of how it works, 1 slide</a:t>
-            </a:r>
-            <a:endParaRPr lang="en-US" sz="2000" b="0" i="0" u="none" strike="noStrike" cap="none" dirty="0">
-              <a:solidFill>
-                <a:schemeClr val="dk1"/>
-              </a:solidFill>
-              <a:latin typeface="Calibri"/>
-              <a:ea typeface="Calibri"/>
-              <a:cs typeface="Calibri"/>
-              <a:sym typeface="Calibri"/>
-            </a:endParaRPr>
+              <a:t>1 min for tech option 2</a:t>
+            </a:r>
           </a:p>
           <a:p>
             <a:pPr lvl="1" indent="-342900">
@@ -4667,7 +4658,7 @@
                 <a:cs typeface="Calibri"/>
                 <a:sym typeface="Calibri"/>
               </a:rPr>
-              <a:t>Appeal of choice: 1 slide</a:t>
+              <a:t>1 min for tech option 3</a:t>
             </a:r>
           </a:p>
           <a:p>
@@ -4683,30 +4674,17 @@
               <a:buChar char="•"/>
             </a:pPr>
             <a:r>
-              <a:rPr lang="en-US" sz="2000" b="0" i="0" u="none" strike="noStrike" cap="none" dirty="0">
-                <a:solidFill>
-                  <a:schemeClr val="dk1"/>
-                </a:solidFill>
-                <a:latin typeface="Calibri"/>
-                <a:ea typeface="Calibri"/>
-                <a:cs typeface="Calibri"/>
-                <a:sym typeface="Calibri"/>
-              </a:rPr>
-              <a:t>Drawbacks of choice: 1 slide</a:t>
-            </a:r>
-          </a:p>
-          <a:p>
-            <a:pPr lvl="1" indent="-342900">
-              <a:spcBef>
-                <a:spcPts val="0"/>
-              </a:spcBef>
-              <a:buClr>
-                <a:schemeClr val="dk1"/>
-              </a:buClr>
-              <a:buSzPct val="100000"/>
-              <a:buFont typeface="Arial"/>
-              <a:buChar char="•"/>
-            </a:pPr>
+              <a:rPr lang="en-US" sz="2000">
+                <a:solidFill>
+                  <a:schemeClr val="dk1"/>
+                </a:solidFill>
+                <a:latin typeface="Calibri"/>
+                <a:ea typeface="Calibri"/>
+                <a:cs typeface="Calibri"/>
+                <a:sym typeface="Calibri"/>
+              </a:rPr>
+              <a:t>1 min for summary of selection</a:t>
+            </a:r>
             <a:endParaRPr lang="en-US" sz="2000" dirty="0">
               <a:solidFill>
                 <a:schemeClr val="dk1"/>

</xml_diff>